<commit_message>
add some buttons + changed receive clue/ give clue
</commit_message>
<xml_diff>
--- a/supports/boutons.pptx
+++ b/supports/boutons.pptx
@@ -7,6 +7,8 @@
   <p:sldIdLst>
     <p:sldId id="256" r:id="rId2"/>
     <p:sldId id="257" r:id="rId3"/>
+    <p:sldId id="259" r:id="rId4"/>
+    <p:sldId id="258" r:id="rId5"/>
   </p:sldIdLst>
   <p:sldSz cx="12192000" cy="6858000"/>
   <p:notesSz cx="6858000" cy="9144000"/>
@@ -105,6 +107,11 @@
       </a:defRPr>
     </a:lvl9pPr>
   </p:defaultTextStyle>
+  <p:extLst>
+    <p:ext uri="{EFAFB233-063F-42B5-8137-9DF3F51BA10A}">
+      <p15:sldGuideLst xmlns:p15="http://schemas.microsoft.com/office/powerpoint/2012/main"/>
+    </p:ext>
+  </p:extLst>
 </p:presentation>
 </file>
 
@@ -255,7 +262,7 @@
           <a:p>
             <a:fld id="{1C7A1911-951E-46FA-BAF7-578AE8E7F852}" type="datetimeFigureOut">
               <a:rPr lang="fr-FR" smtClean="0"/>
-              <a:t>01/05/2020</a:t>
+              <a:t>08/05/2020</a:t>
             </a:fld>
             <a:endParaRPr lang="fr-FR"/>
           </a:p>
@@ -453,7 +460,7 @@
           <a:p>
             <a:fld id="{1C7A1911-951E-46FA-BAF7-578AE8E7F852}" type="datetimeFigureOut">
               <a:rPr lang="fr-FR" smtClean="0"/>
-              <a:t>01/05/2020</a:t>
+              <a:t>08/05/2020</a:t>
             </a:fld>
             <a:endParaRPr lang="fr-FR"/>
           </a:p>
@@ -661,7 +668,7 @@
           <a:p>
             <a:fld id="{1C7A1911-951E-46FA-BAF7-578AE8E7F852}" type="datetimeFigureOut">
               <a:rPr lang="fr-FR" smtClean="0"/>
-              <a:t>01/05/2020</a:t>
+              <a:t>08/05/2020</a:t>
             </a:fld>
             <a:endParaRPr lang="fr-FR"/>
           </a:p>
@@ -859,7 +866,7 @@
           <a:p>
             <a:fld id="{1C7A1911-951E-46FA-BAF7-578AE8E7F852}" type="datetimeFigureOut">
               <a:rPr lang="fr-FR" smtClean="0"/>
-              <a:t>01/05/2020</a:t>
+              <a:t>08/05/2020</a:t>
             </a:fld>
             <a:endParaRPr lang="fr-FR"/>
           </a:p>
@@ -1134,7 +1141,7 @@
           <a:p>
             <a:fld id="{1C7A1911-951E-46FA-BAF7-578AE8E7F852}" type="datetimeFigureOut">
               <a:rPr lang="fr-FR" smtClean="0"/>
-              <a:t>01/05/2020</a:t>
+              <a:t>08/05/2020</a:t>
             </a:fld>
             <a:endParaRPr lang="fr-FR"/>
           </a:p>
@@ -1399,7 +1406,7 @@
           <a:p>
             <a:fld id="{1C7A1911-951E-46FA-BAF7-578AE8E7F852}" type="datetimeFigureOut">
               <a:rPr lang="fr-FR" smtClean="0"/>
-              <a:t>01/05/2020</a:t>
+              <a:t>08/05/2020</a:t>
             </a:fld>
             <a:endParaRPr lang="fr-FR"/>
           </a:p>
@@ -1811,7 +1818,7 @@
           <a:p>
             <a:fld id="{1C7A1911-951E-46FA-BAF7-578AE8E7F852}" type="datetimeFigureOut">
               <a:rPr lang="fr-FR" smtClean="0"/>
-              <a:t>01/05/2020</a:t>
+              <a:t>08/05/2020</a:t>
             </a:fld>
             <a:endParaRPr lang="fr-FR"/>
           </a:p>
@@ -1952,7 +1959,7 @@
           <a:p>
             <a:fld id="{1C7A1911-951E-46FA-BAF7-578AE8E7F852}" type="datetimeFigureOut">
               <a:rPr lang="fr-FR" smtClean="0"/>
-              <a:t>01/05/2020</a:t>
+              <a:t>08/05/2020</a:t>
             </a:fld>
             <a:endParaRPr lang="fr-FR"/>
           </a:p>
@@ -2065,7 +2072,7 @@
           <a:p>
             <a:fld id="{1C7A1911-951E-46FA-BAF7-578AE8E7F852}" type="datetimeFigureOut">
               <a:rPr lang="fr-FR" smtClean="0"/>
-              <a:t>01/05/2020</a:t>
+              <a:t>08/05/2020</a:t>
             </a:fld>
             <a:endParaRPr lang="fr-FR"/>
           </a:p>
@@ -2376,7 +2383,7 @@
           <a:p>
             <a:fld id="{1C7A1911-951E-46FA-BAF7-578AE8E7F852}" type="datetimeFigureOut">
               <a:rPr lang="fr-FR" smtClean="0"/>
-              <a:t>01/05/2020</a:t>
+              <a:t>08/05/2020</a:t>
             </a:fld>
             <a:endParaRPr lang="fr-FR"/>
           </a:p>
@@ -2664,7 +2671,7 @@
           <a:p>
             <a:fld id="{1C7A1911-951E-46FA-BAF7-578AE8E7F852}" type="datetimeFigureOut">
               <a:rPr lang="fr-FR" smtClean="0"/>
-              <a:t>01/05/2020</a:t>
+              <a:t>08/05/2020</a:t>
             </a:fld>
             <a:endParaRPr lang="fr-FR"/>
           </a:p>
@@ -2905,7 +2912,7 @@
           <a:p>
             <a:fld id="{1C7A1911-951E-46FA-BAF7-578AE8E7F852}" type="datetimeFigureOut">
               <a:rPr lang="fr-FR" smtClean="0"/>
-              <a:t>01/05/2020</a:t>
+              <a:t>08/05/2020</a:t>
             </a:fld>
             <a:endParaRPr lang="fr-FR"/>
           </a:p>
@@ -3812,6 +3819,662 @@
 </p:sld>
 </file>
 
+<file path=ppt/slides/slide3.xml><?xml version="1.0" encoding="utf-8"?>
+<p:sld xmlns:a="http://schemas.openxmlformats.org/drawingml/2006/main" xmlns:r="http://schemas.openxmlformats.org/officeDocument/2006/relationships" xmlns:p="http://schemas.openxmlformats.org/presentationml/2006/main">
+  <p:cSld>
+    <p:spTree>
+      <p:nvGrpSpPr>
+        <p:cNvPr id="1" name=""/>
+        <p:cNvGrpSpPr/>
+        <p:nvPr/>
+      </p:nvGrpSpPr>
+      <p:grpSpPr>
+        <a:xfrm>
+          <a:off x="0" y="0"/>
+          <a:ext cx="0" cy="0"/>
+          <a:chOff x="0" y="0"/>
+          <a:chExt cx="0" cy="0"/>
+        </a:xfrm>
+      </p:grpSpPr>
+      <p:sp>
+        <p:nvSpPr>
+          <p:cNvPr id="2" name="Rectangle : coins arrondis 1">
+            <a:extLst>
+              <a:ext uri="{FF2B5EF4-FFF2-40B4-BE49-F238E27FC236}">
+                <a16:creationId xmlns:a16="http://schemas.microsoft.com/office/drawing/2014/main" id="{4C0CBA6D-9474-480B-9D1A-15B0E999D70A}"/>
+              </a:ext>
+            </a:extLst>
+          </p:cNvPr>
+          <p:cNvSpPr/>
+          <p:nvPr/>
+        </p:nvSpPr>
+        <p:spPr>
+          <a:xfrm>
+            <a:off x="0" y="805948"/>
+            <a:ext cx="6484947" cy="1733433"/>
+          </a:xfrm>
+          <a:prstGeom prst="roundRect">
+            <a:avLst/>
+          </a:prstGeom>
+          <a:solidFill>
+            <a:srgbClr val="002060"/>
+          </a:solidFill>
+        </p:spPr>
+        <p:style>
+          <a:lnRef idx="0">
+            <a:schemeClr val="accent1"/>
+          </a:lnRef>
+          <a:fillRef idx="3">
+            <a:schemeClr val="accent1"/>
+          </a:fillRef>
+          <a:effectRef idx="3">
+            <a:schemeClr val="accent1"/>
+          </a:effectRef>
+          <a:fontRef idx="minor">
+            <a:schemeClr val="lt1"/>
+          </a:fontRef>
+        </p:style>
+        <p:txBody>
+          <a:bodyPr rtlCol="0" anchor="ctr"/>
+          <a:lstStyle/>
+          <a:p>
+            <a:pPr algn="ctr"/>
+            <a:r>
+              <a:rPr lang="fr-FR" sz="5400" b="1" dirty="0">
+                <a:ln w="9525">
+                  <a:solidFill>
+                    <a:schemeClr val="bg1"/>
+                  </a:solidFill>
+                  <a:prstDash val="solid"/>
+                </a:ln>
+                <a:solidFill>
+                  <a:schemeClr val="bg1"/>
+                </a:solidFill>
+                <a:effectLst>
+                  <a:outerShdw blurRad="12700" dist="38100" dir="2700000" algn="tl" rotWithShape="0">
+                    <a:schemeClr val="bg1">
+                      <a:lumMod val="50000"/>
+                    </a:schemeClr>
+                  </a:outerShdw>
+                </a:effectLst>
+                <a:latin typeface="Ink Free" panose="03080402000500000000" pitchFamily="66" charset="0"/>
+              </a:rPr>
+              <a:t>Rejoindre le serveur</a:t>
+            </a:r>
+            <a:endParaRPr lang="fr-FR" sz="10000" b="1" dirty="0">
+              <a:solidFill>
+                <a:schemeClr val="bg1"/>
+              </a:solidFill>
+              <a:effectLst>
+                <a:outerShdw blurRad="38100" dist="38100" dir="2700000" algn="tl">
+                  <a:srgbClr val="000000">
+                    <a:alpha val="43137"/>
+                  </a:srgbClr>
+                </a:outerShdw>
+              </a:effectLst>
+              <a:latin typeface="Ink Free" panose="03080402000500000000" pitchFamily="66" charset="0"/>
+            </a:endParaRPr>
+          </a:p>
+        </p:txBody>
+      </p:sp>
+      <p:sp>
+        <p:nvSpPr>
+          <p:cNvPr id="5" name="Rectangle : coins arrondis 4">
+            <a:extLst>
+              <a:ext uri="{FF2B5EF4-FFF2-40B4-BE49-F238E27FC236}">
+                <a16:creationId xmlns:a16="http://schemas.microsoft.com/office/drawing/2014/main" id="{4A4F9709-3F26-4452-B9EF-F5F3C68161B3}"/>
+              </a:ext>
+            </a:extLst>
+          </p:cNvPr>
+          <p:cNvSpPr/>
+          <p:nvPr/>
+        </p:nvSpPr>
+        <p:spPr>
+          <a:xfrm>
+            <a:off x="6642958" y="805948"/>
+            <a:ext cx="6484947" cy="1733433"/>
+          </a:xfrm>
+          <a:prstGeom prst="roundRect">
+            <a:avLst/>
+          </a:prstGeom>
+          <a:solidFill>
+            <a:srgbClr val="002060"/>
+          </a:solidFill>
+        </p:spPr>
+        <p:style>
+          <a:lnRef idx="0">
+            <a:schemeClr val="accent1"/>
+          </a:lnRef>
+          <a:fillRef idx="3">
+            <a:schemeClr val="accent1"/>
+          </a:fillRef>
+          <a:effectRef idx="3">
+            <a:schemeClr val="accent1"/>
+          </a:effectRef>
+          <a:fontRef idx="minor">
+            <a:schemeClr val="lt1"/>
+          </a:fontRef>
+        </p:style>
+        <p:txBody>
+          <a:bodyPr rtlCol="0" anchor="ctr"/>
+          <a:lstStyle/>
+          <a:p>
+            <a:pPr algn="ctr"/>
+            <a:r>
+              <a:rPr lang="fr-FR" sz="5400" b="1" dirty="0">
+                <a:ln w="9525">
+                  <a:solidFill>
+                    <a:schemeClr val="bg1"/>
+                  </a:solidFill>
+                  <a:prstDash val="solid"/>
+                </a:ln>
+                <a:solidFill>
+                  <a:schemeClr val="bg1"/>
+                </a:solidFill>
+                <a:effectLst>
+                  <a:outerShdw blurRad="12700" dist="38100" dir="2700000" algn="tl" rotWithShape="0">
+                    <a:schemeClr val="bg1">
+                      <a:lumMod val="50000"/>
+                    </a:schemeClr>
+                  </a:outerShdw>
+                </a:effectLst>
+                <a:latin typeface="Ink Free" panose="03080402000500000000" pitchFamily="66" charset="0"/>
+              </a:rPr>
+              <a:t>Lancer la partie</a:t>
+            </a:r>
+            <a:endParaRPr lang="fr-FR" sz="10000" b="1" dirty="0">
+              <a:solidFill>
+                <a:schemeClr val="bg1"/>
+              </a:solidFill>
+              <a:effectLst>
+                <a:outerShdw blurRad="38100" dist="38100" dir="2700000" algn="tl">
+                  <a:srgbClr val="000000">
+                    <a:alpha val="43137"/>
+                  </a:srgbClr>
+                </a:outerShdw>
+              </a:effectLst>
+              <a:latin typeface="Ink Free" panose="03080402000500000000" pitchFamily="66" charset="0"/>
+            </a:endParaRPr>
+          </a:p>
+        </p:txBody>
+      </p:sp>
+      <p:sp>
+        <p:nvSpPr>
+          <p:cNvPr id="6" name="Rectangle : coins arrondis 5">
+            <a:extLst>
+              <a:ext uri="{FF2B5EF4-FFF2-40B4-BE49-F238E27FC236}">
+                <a16:creationId xmlns:a16="http://schemas.microsoft.com/office/drawing/2014/main" id="{E4B86C0F-0996-4028-AF3D-22EDA0EF2815}"/>
+              </a:ext>
+            </a:extLst>
+          </p:cNvPr>
+          <p:cNvSpPr/>
+          <p:nvPr/>
+        </p:nvSpPr>
+        <p:spPr>
+          <a:xfrm>
+            <a:off x="-144921" y="3198527"/>
+            <a:ext cx="6484947" cy="1733433"/>
+          </a:xfrm>
+          <a:prstGeom prst="roundRect">
+            <a:avLst/>
+          </a:prstGeom>
+          <a:solidFill>
+            <a:srgbClr val="002060"/>
+          </a:solidFill>
+          <a:ln w="76200">
+            <a:solidFill>
+              <a:schemeClr val="bg1"/>
+            </a:solidFill>
+          </a:ln>
+        </p:spPr>
+        <p:style>
+          <a:lnRef idx="0">
+            <a:schemeClr val="accent1"/>
+          </a:lnRef>
+          <a:fillRef idx="3">
+            <a:schemeClr val="accent1"/>
+          </a:fillRef>
+          <a:effectRef idx="3">
+            <a:schemeClr val="accent1"/>
+          </a:effectRef>
+          <a:fontRef idx="minor">
+            <a:schemeClr val="lt1"/>
+          </a:fontRef>
+        </p:style>
+        <p:txBody>
+          <a:bodyPr rtlCol="0" anchor="ctr"/>
+          <a:lstStyle/>
+          <a:p>
+            <a:pPr algn="ctr"/>
+            <a:r>
+              <a:rPr lang="fr-FR" sz="5400" b="1" spc="50" dirty="0">
+                <a:ln w="0"/>
+                <a:solidFill>
+                  <a:schemeClr val="bg2"/>
+                </a:solidFill>
+                <a:effectLst>
+                  <a:innerShdw blurRad="63500" dist="50800" dir="13500000">
+                    <a:srgbClr val="000000">
+                      <a:alpha val="50000"/>
+                    </a:srgbClr>
+                  </a:innerShdw>
+                </a:effectLst>
+                <a:latin typeface="Ink Free" panose="03080402000500000000" pitchFamily="66" charset="0"/>
+              </a:rPr>
+              <a:t>Rejoindre le serveur</a:t>
+            </a:r>
+          </a:p>
+        </p:txBody>
+      </p:sp>
+      <p:sp>
+        <p:nvSpPr>
+          <p:cNvPr id="10" name="Rectangle : coins arrondis 9">
+            <a:extLst>
+              <a:ext uri="{FF2B5EF4-FFF2-40B4-BE49-F238E27FC236}">
+                <a16:creationId xmlns:a16="http://schemas.microsoft.com/office/drawing/2014/main" id="{B9CD4E48-B00D-4EAF-8670-5988725DF219}"/>
+              </a:ext>
+            </a:extLst>
+          </p:cNvPr>
+          <p:cNvSpPr/>
+          <p:nvPr/>
+        </p:nvSpPr>
+        <p:spPr>
+          <a:xfrm>
+            <a:off x="6642958" y="3198526"/>
+            <a:ext cx="6484947" cy="1733433"/>
+          </a:xfrm>
+          <a:prstGeom prst="roundRect">
+            <a:avLst/>
+          </a:prstGeom>
+          <a:solidFill>
+            <a:srgbClr val="002060"/>
+          </a:solidFill>
+          <a:ln w="76200">
+            <a:solidFill>
+              <a:schemeClr val="bg1"/>
+            </a:solidFill>
+          </a:ln>
+        </p:spPr>
+        <p:style>
+          <a:lnRef idx="0">
+            <a:schemeClr val="accent1"/>
+          </a:lnRef>
+          <a:fillRef idx="3">
+            <a:schemeClr val="accent1"/>
+          </a:fillRef>
+          <a:effectRef idx="3">
+            <a:schemeClr val="accent1"/>
+          </a:effectRef>
+          <a:fontRef idx="minor">
+            <a:schemeClr val="lt1"/>
+          </a:fontRef>
+        </p:style>
+        <p:txBody>
+          <a:bodyPr rtlCol="0" anchor="ctr"/>
+          <a:lstStyle/>
+          <a:p>
+            <a:pPr algn="ctr"/>
+            <a:r>
+              <a:rPr lang="fr-FR" sz="5400" b="1" spc="50" dirty="0">
+                <a:ln w="0"/>
+                <a:solidFill>
+                  <a:schemeClr val="bg2"/>
+                </a:solidFill>
+                <a:effectLst>
+                  <a:innerShdw blurRad="63500" dist="50800" dir="13500000">
+                    <a:srgbClr val="000000">
+                      <a:alpha val="50000"/>
+                    </a:srgbClr>
+                  </a:innerShdw>
+                </a:effectLst>
+                <a:latin typeface="Ink Free" panose="03080402000500000000" pitchFamily="66" charset="0"/>
+              </a:rPr>
+              <a:t>Lancer la partie</a:t>
+            </a:r>
+          </a:p>
+        </p:txBody>
+      </p:sp>
+    </p:spTree>
+    <p:extLst>
+      <p:ext uri="{BB962C8B-B14F-4D97-AF65-F5344CB8AC3E}">
+        <p14:creationId xmlns:p14="http://schemas.microsoft.com/office/powerpoint/2010/main" val="1634066192"/>
+      </p:ext>
+    </p:extLst>
+  </p:cSld>
+  <p:clrMapOvr>
+    <a:masterClrMapping/>
+  </p:clrMapOvr>
+</p:sld>
+</file>
+
+<file path=ppt/slides/slide4.xml><?xml version="1.0" encoding="utf-8"?>
+<p:sld xmlns:a="http://schemas.openxmlformats.org/drawingml/2006/main" xmlns:r="http://schemas.openxmlformats.org/officeDocument/2006/relationships" xmlns:p="http://schemas.openxmlformats.org/presentationml/2006/main">
+  <p:cSld>
+    <p:spTree>
+      <p:nvGrpSpPr>
+        <p:cNvPr id="1" name=""/>
+        <p:cNvGrpSpPr/>
+        <p:nvPr/>
+      </p:nvGrpSpPr>
+      <p:grpSpPr>
+        <a:xfrm>
+          <a:off x="0" y="0"/>
+          <a:ext cx="0" cy="0"/>
+          <a:chOff x="0" y="0"/>
+          <a:chExt cx="0" cy="0"/>
+        </a:xfrm>
+      </p:grpSpPr>
+      <p:sp>
+        <p:nvSpPr>
+          <p:cNvPr id="8" name="Rectangle : coins arrondis 7">
+            <a:extLst>
+              <a:ext uri="{FF2B5EF4-FFF2-40B4-BE49-F238E27FC236}">
+                <a16:creationId xmlns:a16="http://schemas.microsoft.com/office/drawing/2014/main" id="{ABED2BEE-B734-4A46-B795-04CEE7727382}"/>
+              </a:ext>
+            </a:extLst>
+          </p:cNvPr>
+          <p:cNvSpPr/>
+          <p:nvPr/>
+        </p:nvSpPr>
+        <p:spPr>
+          <a:xfrm>
+            <a:off x="1739044" y="673177"/>
+            <a:ext cx="4890824" cy="1733433"/>
+          </a:xfrm>
+          <a:prstGeom prst="roundRect">
+            <a:avLst/>
+          </a:prstGeom>
+          <a:solidFill>
+            <a:srgbClr val="002060"/>
+          </a:solidFill>
+          <a:ln w="76200">
+            <a:solidFill>
+              <a:schemeClr val="bg1"/>
+            </a:solidFill>
+          </a:ln>
+        </p:spPr>
+        <p:style>
+          <a:lnRef idx="0">
+            <a:schemeClr val="accent1"/>
+          </a:lnRef>
+          <a:fillRef idx="3">
+            <a:schemeClr val="accent1"/>
+          </a:fillRef>
+          <a:effectRef idx="3">
+            <a:schemeClr val="accent1"/>
+          </a:effectRef>
+          <a:fontRef idx="minor">
+            <a:schemeClr val="lt1"/>
+          </a:fontRef>
+        </p:style>
+        <p:txBody>
+          <a:bodyPr rtlCol="0" anchor="ctr"/>
+          <a:lstStyle/>
+          <a:p>
+            <a:pPr algn="ctr"/>
+            <a:r>
+              <a:rPr lang="fr-FR" sz="10000" b="1" spc="50" dirty="0">
+                <a:ln w="0"/>
+                <a:solidFill>
+                  <a:schemeClr val="bg2"/>
+                </a:solidFill>
+                <a:effectLst>
+                  <a:innerShdw blurRad="63500" dist="50800" dir="13500000">
+                    <a:srgbClr val="000000">
+                      <a:alpha val="50000"/>
+                    </a:srgbClr>
+                  </a:innerShdw>
+                </a:effectLst>
+                <a:latin typeface="Ink Free" panose="03080402000500000000" pitchFamily="66" charset="0"/>
+              </a:rPr>
+              <a:t>OK</a:t>
+            </a:r>
+          </a:p>
+        </p:txBody>
+      </p:sp>
+      <p:sp>
+        <p:nvSpPr>
+          <p:cNvPr id="9" name="Rectangle : coins arrondis 8">
+            <a:extLst>
+              <a:ext uri="{FF2B5EF4-FFF2-40B4-BE49-F238E27FC236}">
+                <a16:creationId xmlns:a16="http://schemas.microsoft.com/office/drawing/2014/main" id="{62461839-B0A0-4C10-B456-A35592F05BC4}"/>
+              </a:ext>
+            </a:extLst>
+          </p:cNvPr>
+          <p:cNvSpPr/>
+          <p:nvPr/>
+        </p:nvSpPr>
+        <p:spPr>
+          <a:xfrm>
+            <a:off x="1751198" y="2822669"/>
+            <a:ext cx="4890824" cy="1733433"/>
+          </a:xfrm>
+          <a:prstGeom prst="roundRect">
+            <a:avLst/>
+          </a:prstGeom>
+          <a:solidFill>
+            <a:srgbClr val="002060"/>
+          </a:solidFill>
+          <a:ln w="76200">
+            <a:solidFill>
+              <a:schemeClr val="bg1"/>
+            </a:solidFill>
+          </a:ln>
+        </p:spPr>
+        <p:style>
+          <a:lnRef idx="0">
+            <a:schemeClr val="accent1"/>
+          </a:lnRef>
+          <a:fillRef idx="3">
+            <a:schemeClr val="accent1"/>
+          </a:fillRef>
+          <a:effectRef idx="3">
+            <a:schemeClr val="accent1"/>
+          </a:effectRef>
+          <a:fontRef idx="minor">
+            <a:schemeClr val="lt1"/>
+          </a:fontRef>
+        </p:style>
+        <p:txBody>
+          <a:bodyPr rtlCol="0" anchor="ctr"/>
+          <a:lstStyle/>
+          <a:p>
+            <a:pPr algn="ctr"/>
+            <a:r>
+              <a:rPr lang="fr-FR" sz="10000" b="1" spc="50" dirty="0">
+                <a:ln w="0"/>
+                <a:solidFill>
+                  <a:schemeClr val="bg2"/>
+                </a:solidFill>
+                <a:effectLst>
+                  <a:innerShdw blurRad="63500" dist="50800" dir="13500000">
+                    <a:srgbClr val="000000">
+                      <a:alpha val="50000"/>
+                    </a:srgbClr>
+                  </a:innerShdw>
+                </a:effectLst>
+                <a:latin typeface="Ink Free" panose="03080402000500000000" pitchFamily="66" charset="0"/>
+              </a:rPr>
+              <a:t>Annuler</a:t>
+            </a:r>
+          </a:p>
+        </p:txBody>
+      </p:sp>
+      <p:sp>
+        <p:nvSpPr>
+          <p:cNvPr id="5" name="Rectangle : coins arrondis 4">
+            <a:extLst>
+              <a:ext uri="{FF2B5EF4-FFF2-40B4-BE49-F238E27FC236}">
+                <a16:creationId xmlns:a16="http://schemas.microsoft.com/office/drawing/2014/main" id="{51C5ED23-93A8-4075-9F0E-EF75E319F488}"/>
+              </a:ext>
+            </a:extLst>
+          </p:cNvPr>
+          <p:cNvSpPr/>
+          <p:nvPr/>
+        </p:nvSpPr>
+        <p:spPr>
+          <a:xfrm>
+            <a:off x="6817796" y="673177"/>
+            <a:ext cx="4890824" cy="1733433"/>
+          </a:xfrm>
+          <a:prstGeom prst="roundRect">
+            <a:avLst/>
+          </a:prstGeom>
+          <a:solidFill>
+            <a:srgbClr val="002060"/>
+          </a:solidFill>
+        </p:spPr>
+        <p:style>
+          <a:lnRef idx="0">
+            <a:schemeClr val="accent1"/>
+          </a:lnRef>
+          <a:fillRef idx="3">
+            <a:schemeClr val="accent1"/>
+          </a:fillRef>
+          <a:effectRef idx="3">
+            <a:schemeClr val="accent1"/>
+          </a:effectRef>
+          <a:fontRef idx="minor">
+            <a:schemeClr val="lt1"/>
+          </a:fontRef>
+        </p:style>
+        <p:txBody>
+          <a:bodyPr rtlCol="0" anchor="ctr"/>
+          <a:lstStyle/>
+          <a:p>
+            <a:pPr algn="ctr"/>
+            <a:r>
+              <a:rPr lang="fr-FR" sz="10000" b="1" dirty="0">
+                <a:ln w="9525">
+                  <a:solidFill>
+                    <a:schemeClr val="bg1"/>
+                  </a:solidFill>
+                  <a:prstDash val="solid"/>
+                </a:ln>
+                <a:solidFill>
+                  <a:schemeClr val="bg1"/>
+                </a:solidFill>
+                <a:effectLst>
+                  <a:outerShdw blurRad="12700" dist="38100" dir="2700000" algn="tl" rotWithShape="0">
+                    <a:schemeClr val="bg1">
+                      <a:lumMod val="50000"/>
+                    </a:schemeClr>
+                  </a:outerShdw>
+                </a:effectLst>
+                <a:latin typeface="Ink Free" panose="03080402000500000000" pitchFamily="66" charset="0"/>
+              </a:rPr>
+              <a:t>OK</a:t>
+            </a:r>
+            <a:endParaRPr lang="fr-FR" sz="10000" b="1" dirty="0">
+              <a:solidFill>
+                <a:schemeClr val="bg1"/>
+              </a:solidFill>
+              <a:effectLst>
+                <a:outerShdw blurRad="38100" dist="38100" dir="2700000" algn="tl">
+                  <a:srgbClr val="000000">
+                    <a:alpha val="43137"/>
+                  </a:srgbClr>
+                </a:outerShdw>
+              </a:effectLst>
+              <a:latin typeface="Ink Free" panose="03080402000500000000" pitchFamily="66" charset="0"/>
+            </a:endParaRPr>
+          </a:p>
+        </p:txBody>
+      </p:sp>
+      <p:sp>
+        <p:nvSpPr>
+          <p:cNvPr id="6" name="Rectangle : coins arrondis 5">
+            <a:extLst>
+              <a:ext uri="{FF2B5EF4-FFF2-40B4-BE49-F238E27FC236}">
+                <a16:creationId xmlns:a16="http://schemas.microsoft.com/office/drawing/2014/main" id="{2DB0E51C-2937-420F-9808-E6C9EC67080D}"/>
+              </a:ext>
+            </a:extLst>
+          </p:cNvPr>
+          <p:cNvSpPr/>
+          <p:nvPr/>
+        </p:nvSpPr>
+        <p:spPr>
+          <a:xfrm>
+            <a:off x="6817796" y="2822669"/>
+            <a:ext cx="4890824" cy="1733433"/>
+          </a:xfrm>
+          <a:prstGeom prst="roundRect">
+            <a:avLst/>
+          </a:prstGeom>
+          <a:solidFill>
+            <a:srgbClr val="002060"/>
+          </a:solidFill>
+        </p:spPr>
+        <p:style>
+          <a:lnRef idx="0">
+            <a:schemeClr val="accent1"/>
+          </a:lnRef>
+          <a:fillRef idx="3">
+            <a:schemeClr val="accent1"/>
+          </a:fillRef>
+          <a:effectRef idx="3">
+            <a:schemeClr val="accent1"/>
+          </a:effectRef>
+          <a:fontRef idx="minor">
+            <a:schemeClr val="lt1"/>
+          </a:fontRef>
+        </p:style>
+        <p:txBody>
+          <a:bodyPr rtlCol="0" anchor="ctr"/>
+          <a:lstStyle/>
+          <a:p>
+            <a:pPr algn="ctr"/>
+            <a:r>
+              <a:rPr lang="fr-FR" sz="10000" b="1" dirty="0">
+                <a:ln w="9525">
+                  <a:solidFill>
+                    <a:schemeClr val="bg1"/>
+                  </a:solidFill>
+                  <a:prstDash val="solid"/>
+                </a:ln>
+                <a:solidFill>
+                  <a:schemeClr val="bg1"/>
+                </a:solidFill>
+                <a:effectLst>
+                  <a:outerShdw blurRad="12700" dist="38100" dir="2700000" algn="tl" rotWithShape="0">
+                    <a:schemeClr val="bg1">
+                      <a:lumMod val="50000"/>
+                    </a:schemeClr>
+                  </a:outerShdw>
+                </a:effectLst>
+                <a:latin typeface="Ink Free" panose="03080402000500000000" pitchFamily="66" charset="0"/>
+              </a:rPr>
+              <a:t>Annuler</a:t>
+            </a:r>
+            <a:endParaRPr lang="fr-FR" sz="10000" b="1" dirty="0">
+              <a:solidFill>
+                <a:schemeClr val="bg1"/>
+              </a:solidFill>
+              <a:effectLst>
+                <a:outerShdw blurRad="38100" dist="38100" dir="2700000" algn="tl">
+                  <a:srgbClr val="000000">
+                    <a:alpha val="43137"/>
+                  </a:srgbClr>
+                </a:outerShdw>
+              </a:effectLst>
+              <a:latin typeface="Ink Free" panose="03080402000500000000" pitchFamily="66" charset="0"/>
+            </a:endParaRPr>
+          </a:p>
+        </p:txBody>
+      </p:sp>
+    </p:spTree>
+    <p:extLst>
+      <p:ext uri="{BB962C8B-B14F-4D97-AF65-F5344CB8AC3E}">
+        <p14:creationId xmlns:p14="http://schemas.microsoft.com/office/powerpoint/2010/main" val="276594235"/>
+      </p:ext>
+    </p:extLst>
+  </p:cSld>
+  <p:clrMapOvr>
+    <a:masterClrMapping/>
+  </p:clrMapOvr>
+</p:sld>
+</file>
+
 <file path=ppt/theme/theme1.xml><?xml version="1.0" encoding="utf-8"?>
 <a:theme xmlns:a="http://schemas.openxmlformats.org/drawingml/2006/main" name="Thème Office">
   <a:themeElements>

</xml_diff>